<commit_message>
Adding Hydra Connect poster, small tweaks to All staff presentation
</commit_message>
<xml_diff>
--- a/Presentations/Library All Staff 2016 09/allstaff201609.pptx
+++ b/Presentations/Library All Staff 2016 09/allstaff201609.pptx
@@ -114,12 +114,12 @@
   <p:extLst>
     <p:ext uri="{EFAFB233-063F-42B5-8137-9DF3F51BA10A}">
       <p15:sldGuideLst xmlns:p15="http://schemas.microsoft.com/office/powerpoint/2012/main">
-        <p15:guide id="1" orient="horz" pos="2160" userDrawn="1">
+        <p15:guide id="1" orient="horz" pos="528" userDrawn="1">
           <p15:clr>
             <a:srgbClr val="A4A3A4"/>
           </p15:clr>
         </p15:guide>
-        <p15:guide id="2" pos="384" userDrawn="1">
+        <p15:guide id="2" pos="2880" userDrawn="1">
           <p15:clr>
             <a:srgbClr val="A4A3A4"/>
           </p15:clr>
@@ -226,7 +226,7 @@
           <a:p>
             <a:fld id="{D9ECFEF1-2E88-E646-A99D-93EC0DB2D22C}" type="datetimeFigureOut">
               <a:rPr lang="en-US" smtClean="0"/>
-              <a:t>9/23/16</a:t>
+              <a:t>9/26/16</a:t>
             </a:fld>
             <a:endParaRPr lang="en-US"/>
           </a:p>
@@ -1684,7 +1684,7 @@
           <a:p>
             <a:fld id="{C952E0D9-C4C6-B144-92E9-4E0D31DDAA26}" type="datetimeFigureOut">
               <a:rPr lang="en-US" smtClean="0"/>
-              <a:t>9/23/16</a:t>
+              <a:t>9/26/16</a:t>
             </a:fld>
             <a:endParaRPr lang="en-US"/>
           </a:p>
@@ -1854,7 +1854,7 @@
           <a:p>
             <a:fld id="{C952E0D9-C4C6-B144-92E9-4E0D31DDAA26}" type="datetimeFigureOut">
               <a:rPr lang="en-US" smtClean="0"/>
-              <a:t>9/23/16</a:t>
+              <a:t>9/26/16</a:t>
             </a:fld>
             <a:endParaRPr lang="en-US"/>
           </a:p>
@@ -2034,7 +2034,7 @@
           <a:p>
             <a:fld id="{C952E0D9-C4C6-B144-92E9-4E0D31DDAA26}" type="datetimeFigureOut">
               <a:rPr lang="en-US" smtClean="0"/>
-              <a:t>9/23/16</a:t>
+              <a:t>9/26/16</a:t>
             </a:fld>
             <a:endParaRPr lang="en-US"/>
           </a:p>
@@ -2204,7 +2204,7 @@
           <a:p>
             <a:fld id="{C952E0D9-C4C6-B144-92E9-4E0D31DDAA26}" type="datetimeFigureOut">
               <a:rPr lang="en-US" smtClean="0"/>
-              <a:t>9/23/16</a:t>
+              <a:t>9/26/16</a:t>
             </a:fld>
             <a:endParaRPr lang="en-US"/>
           </a:p>
@@ -2450,7 +2450,7 @@
           <a:p>
             <a:fld id="{C952E0D9-C4C6-B144-92E9-4E0D31DDAA26}" type="datetimeFigureOut">
               <a:rPr lang="en-US" smtClean="0"/>
-              <a:t>9/23/16</a:t>
+              <a:t>9/26/16</a:t>
             </a:fld>
             <a:endParaRPr lang="en-US"/>
           </a:p>
@@ -2738,7 +2738,7 @@
           <a:p>
             <a:fld id="{C952E0D9-C4C6-B144-92E9-4E0D31DDAA26}" type="datetimeFigureOut">
               <a:rPr lang="en-US" smtClean="0"/>
-              <a:t>9/23/16</a:t>
+              <a:t>9/26/16</a:t>
             </a:fld>
             <a:endParaRPr lang="en-US"/>
           </a:p>
@@ -3160,7 +3160,7 @@
           <a:p>
             <a:fld id="{C952E0D9-C4C6-B144-92E9-4E0D31DDAA26}" type="datetimeFigureOut">
               <a:rPr lang="en-US" smtClean="0"/>
-              <a:t>9/23/16</a:t>
+              <a:t>9/26/16</a:t>
             </a:fld>
             <a:endParaRPr lang="en-US"/>
           </a:p>
@@ -3278,7 +3278,7 @@
           <a:p>
             <a:fld id="{C952E0D9-C4C6-B144-92E9-4E0D31DDAA26}" type="datetimeFigureOut">
               <a:rPr lang="en-US" smtClean="0"/>
-              <a:t>9/23/16</a:t>
+              <a:t>9/26/16</a:t>
             </a:fld>
             <a:endParaRPr lang="en-US"/>
           </a:p>
@@ -3373,7 +3373,7 @@
           <a:p>
             <a:fld id="{C952E0D9-C4C6-B144-92E9-4E0D31DDAA26}" type="datetimeFigureOut">
               <a:rPr lang="en-US" smtClean="0"/>
-              <a:t>9/23/16</a:t>
+              <a:t>9/26/16</a:t>
             </a:fld>
             <a:endParaRPr lang="en-US"/>
           </a:p>
@@ -3650,7 +3650,7 @@
           <a:p>
             <a:fld id="{C952E0D9-C4C6-B144-92E9-4E0D31DDAA26}" type="datetimeFigureOut">
               <a:rPr lang="en-US" smtClean="0"/>
-              <a:t>9/23/16</a:t>
+              <a:t>9/26/16</a:t>
             </a:fld>
             <a:endParaRPr lang="en-US"/>
           </a:p>
@@ -3907,7 +3907,7 @@
           <a:p>
             <a:fld id="{C952E0D9-C4C6-B144-92E9-4E0D31DDAA26}" type="datetimeFigureOut">
               <a:rPr lang="en-US" smtClean="0"/>
-              <a:t>9/23/16</a:t>
+              <a:t>9/26/16</a:t>
             </a:fld>
             <a:endParaRPr lang="en-US"/>
           </a:p>
@@ -4123,7 +4123,7 @@
           <a:p>
             <a:fld id="{C952E0D9-C4C6-B144-92E9-4E0D31DDAA26}" type="datetimeFigureOut">
               <a:rPr lang="en-US" smtClean="0"/>
-              <a:t>9/23/16</a:t>
+              <a:t>9/26/16</a:t>
             </a:fld>
             <a:endParaRPr lang="en-US"/>
           </a:p>
@@ -4680,7 +4680,7 @@
       </p:sp>
       <p:pic>
         <p:nvPicPr>
-          <p:cNvPr id="3" name="Picture 2"/>
+          <p:cNvPr id="2" name="Picture 1"/>
           <p:cNvPicPr>
             <a:picLocks noChangeAspect="1"/>
           </p:cNvPicPr>
@@ -4700,8 +4700,8 @@
         </p:blipFill>
         <p:spPr>
           <a:xfrm>
-            <a:off x="883942" y="298884"/>
-            <a:ext cx="7376117" cy="5577840"/>
+            <a:off x="0" y="308295"/>
+            <a:ext cx="9144000" cy="5464629"/>
           </a:xfrm>
           <a:prstGeom prst="rect">
             <a:avLst/>
@@ -4934,7 +4934,7 @@
       </p:sp>
       <p:pic>
         <p:nvPicPr>
-          <p:cNvPr id="7" name="Picture 6"/>
+          <p:cNvPr id="8" name="Picture 7"/>
           <p:cNvPicPr>
             <a:picLocks noChangeAspect="1"/>
           </p:cNvPicPr>
@@ -4954,8 +4954,8 @@
         </p:blipFill>
         <p:spPr>
           <a:xfrm>
-            <a:off x="883942" y="298884"/>
-            <a:ext cx="7376117" cy="5577840"/>
+            <a:off x="0" y="308295"/>
+            <a:ext cx="9144000" cy="5464629"/>
           </a:xfrm>
           <a:prstGeom prst="rect">
             <a:avLst/>
@@ -5356,8 +5356,8 @@
         </p:nvSpPr>
         <p:spPr>
           <a:xfrm>
-            <a:off x="248195" y="3440460"/>
-            <a:ext cx="4859383" cy="2240279"/>
+            <a:off x="4986556" y="4103121"/>
+            <a:ext cx="3993160" cy="2240279"/>
           </a:xfrm>
           <a:prstGeom prst="rect">
             <a:avLst/>
@@ -5540,17 +5540,15 @@
                   <a:srgbClr val="26374B"/>
                 </a:solidFill>
               </a:rPr>
-              <a:t>The Catskills Institute</a:t>
-            </a:r>
-          </a:p>
-          <a:p>
+              <a:t>Holocaust </a:t>
+            </a:r>
             <a:r>
               <a:rPr lang="en-US" sz="1700" dirty="0" smtClean="0">
                 <a:solidFill>
                   <a:srgbClr val="26374B"/>
                 </a:solidFill>
               </a:rPr>
-              <a:t>Holocaust Awareness Week Programming</a:t>
+              <a:t>Awareness Week Programming</a:t>
             </a:r>
           </a:p>
           <a:p>
@@ -5560,17 +5558,15 @@
                   <a:srgbClr val="26374B"/>
                 </a:solidFill>
               </a:rPr>
-              <a:t>Spectrum Literary Magazine</a:t>
-            </a:r>
-          </a:p>
-          <a:p>
+              <a:t>DMC </a:t>
+            </a:r>
             <a:r>
               <a:rPr lang="en-US" sz="1700" dirty="0" smtClean="0">
                 <a:solidFill>
                   <a:srgbClr val="26374B"/>
                 </a:solidFill>
               </a:rPr>
-              <a:t>DMC Studios Student Work Showcase</a:t>
+              <a:t>Studios Student Work Showcase</a:t>
             </a:r>
           </a:p>
         </p:txBody>
@@ -5585,7 +5581,7 @@
         </p:nvSpPr>
         <p:spPr>
           <a:xfrm>
-            <a:off x="261258" y="1533290"/>
+            <a:off x="440922" y="2103742"/>
             <a:ext cx="9274628" cy="1381360"/>
           </a:xfrm>
           <a:prstGeom prst="rect">
@@ -5887,21 +5883,34 @@
           </a:p>
           <a:p>
             <a:r>
+              <a:rPr lang="en-US" sz="1700" dirty="0">
+                <a:solidFill>
+                  <a:srgbClr val="26374B"/>
+                </a:solidFill>
+              </a:rPr>
+              <a:t>Spectrum Literary </a:t>
+            </a:r>
+            <a:r>
               <a:rPr lang="en-US" sz="1700" dirty="0" smtClean="0">
                 <a:solidFill>
                   <a:srgbClr val="26374B"/>
                 </a:solidFill>
               </a:rPr>
-              <a:t>Spectrum </a:t>
-            </a:r>
-            <a:r>
-              <a:rPr lang="en-US" sz="1700" dirty="0">
+              <a:t>Magazine </a:t>
+            </a:r>
+            <a:r>
+              <a:rPr lang="en-US" sz="1700" dirty="0" smtClean="0">
                 <a:solidFill>
                   <a:srgbClr val="26374B"/>
                 </a:solidFill>
               </a:rPr>
               <a:t>Archive</a:t>
             </a:r>
+            <a:endParaRPr lang="en-US" sz="1700" dirty="0">
+              <a:solidFill>
+                <a:srgbClr val="26374B"/>
+              </a:solidFill>
+            </a:endParaRPr>
           </a:p>
         </p:txBody>
       </p:sp>
@@ -5913,7 +5922,7 @@
         </p:nvSpPr>
         <p:spPr>
           <a:xfrm>
-            <a:off x="0" y="2913015"/>
+            <a:off x="33556" y="3734522"/>
             <a:ext cx="9144000" cy="369332"/>
           </a:xfrm>
           <a:prstGeom prst="rect">
@@ -5956,7 +5965,7 @@
         </p:nvSpPr>
         <p:spPr>
           <a:xfrm>
-            <a:off x="0" y="1027611"/>
+            <a:off x="62218" y="1648397"/>
             <a:ext cx="9144000" cy="369332"/>
           </a:xfrm>
           <a:prstGeom prst="rect">
@@ -5990,7 +5999,7 @@
         </p:nvSpPr>
         <p:spPr>
           <a:xfrm>
-            <a:off x="0" y="5959196"/>
+            <a:off x="0" y="937598"/>
             <a:ext cx="9144000" cy="461665"/>
           </a:xfrm>
           <a:prstGeom prst="rect">
@@ -6047,7 +6056,7 @@
         </p:nvSpPr>
         <p:spPr>
           <a:xfrm>
-            <a:off x="4807130" y="3436105"/>
+            <a:off x="409935" y="4104700"/>
             <a:ext cx="4162699" cy="2240279"/>
           </a:xfrm>
           <a:prstGeom prst="rect">
@@ -6279,6 +6288,106 @@
               </a:rPr>
               <a:t> College, 1913-1981</a:t>
             </a:r>
+          </a:p>
+        </p:txBody>
+      </p:sp>
+      <p:sp>
+        <p:nvSpPr>
+          <p:cNvPr id="3" name="Rectangle 2"/>
+          <p:cNvSpPr/>
+          <p:nvPr/>
+        </p:nvSpPr>
+        <p:spPr>
+          <a:xfrm>
+            <a:off x="307910" y="1609831"/>
+            <a:ext cx="8528180" cy="1903445"/>
+          </a:xfrm>
+          <a:prstGeom prst="rect">
+            <a:avLst/>
+          </a:prstGeom>
+          <a:noFill/>
+          <a:ln w="19050">
+            <a:solidFill>
+              <a:srgbClr val="26374B"/>
+            </a:solidFill>
+          </a:ln>
+          <a:effectLst/>
+          <a:scene3d>
+            <a:camera prst="orthographicFront"/>
+            <a:lightRig rig="threePt" dir="t"/>
+          </a:scene3d>
+          <a:sp3d prstMaterial="matte"/>
+        </p:spPr>
+        <p:style>
+          <a:lnRef idx="1">
+            <a:schemeClr val="accent1"/>
+          </a:lnRef>
+          <a:fillRef idx="3">
+            <a:schemeClr val="accent1"/>
+          </a:fillRef>
+          <a:effectRef idx="2">
+            <a:schemeClr val="accent1"/>
+          </a:effectRef>
+          <a:fontRef idx="minor">
+            <a:schemeClr val="lt1"/>
+          </a:fontRef>
+        </p:style>
+        <p:txBody>
+          <a:bodyPr rtlCol="0" anchor="ctr"/>
+          <a:lstStyle/>
+          <a:p>
+            <a:pPr algn="ctr"/>
+            <a:endParaRPr lang="en-US"/>
+          </a:p>
+        </p:txBody>
+      </p:sp>
+      <p:sp>
+        <p:nvSpPr>
+          <p:cNvPr id="12" name="Rectangle 11"/>
+          <p:cNvSpPr/>
+          <p:nvPr/>
+        </p:nvSpPr>
+        <p:spPr>
+          <a:xfrm>
+            <a:off x="307910" y="3713390"/>
+            <a:ext cx="8528180" cy="2796468"/>
+          </a:xfrm>
+          <a:prstGeom prst="rect">
+            <a:avLst/>
+          </a:prstGeom>
+          <a:noFill/>
+          <a:ln w="19050">
+            <a:solidFill>
+              <a:srgbClr val="26374B"/>
+            </a:solidFill>
+          </a:ln>
+          <a:effectLst/>
+          <a:scene3d>
+            <a:camera prst="orthographicFront"/>
+            <a:lightRig rig="threePt" dir="t"/>
+          </a:scene3d>
+          <a:sp3d prstMaterial="matte"/>
+        </p:spPr>
+        <p:style>
+          <a:lnRef idx="1">
+            <a:schemeClr val="accent1"/>
+          </a:lnRef>
+          <a:fillRef idx="3">
+            <a:schemeClr val="accent1"/>
+          </a:fillRef>
+          <a:effectRef idx="2">
+            <a:schemeClr val="accent1"/>
+          </a:effectRef>
+          <a:fontRef idx="minor">
+            <a:schemeClr val="lt1"/>
+          </a:fontRef>
+        </p:style>
+        <p:txBody>
+          <a:bodyPr rtlCol="0" anchor="ctr"/>
+          <a:lstStyle/>
+          <a:p>
+            <a:pPr algn="ctr"/>
+            <a:endParaRPr lang="en-US"/>
           </a:p>
         </p:txBody>
       </p:sp>

</xml_diff>